<commit_message>
APS finalizada utilizando o compilador desenvolvido em sala
</commit_message>
<xml_diff>
--- a/APS – MINHA LINGUAGEM DE PROGRAMAÇÃO.pptx
+++ b/APS – MINHA LINGUAGEM DE PROGRAMAÇÃO.pptx
@@ -267,7 +267,7 @@
           <a:p>
             <a:fld id="{A6DB111E-2BBC-4A19-AC5A-7193F79F09DA}" type="datetimeFigureOut">
               <a:rPr lang="en-US" smtClean="0"/>
-              <a:t>6/10/2023</a:t>
+              <a:t>6/12/2023</a:t>
             </a:fld>
             <a:endParaRPr lang="en-US"/>
           </a:p>
@@ -465,7 +465,7 @@
           <a:p>
             <a:fld id="{A6DB111E-2BBC-4A19-AC5A-7193F79F09DA}" type="datetimeFigureOut">
               <a:rPr lang="en-US" smtClean="0"/>
-              <a:t>6/10/2023</a:t>
+              <a:t>6/12/2023</a:t>
             </a:fld>
             <a:endParaRPr lang="en-US"/>
           </a:p>
@@ -673,7 +673,7 @@
           <a:p>
             <a:fld id="{A6DB111E-2BBC-4A19-AC5A-7193F79F09DA}" type="datetimeFigureOut">
               <a:rPr lang="en-US" smtClean="0"/>
-              <a:t>6/10/2023</a:t>
+              <a:t>6/12/2023</a:t>
             </a:fld>
             <a:endParaRPr lang="en-US"/>
           </a:p>
@@ -871,7 +871,7 @@
           <a:p>
             <a:fld id="{A6DB111E-2BBC-4A19-AC5A-7193F79F09DA}" type="datetimeFigureOut">
               <a:rPr lang="en-US" smtClean="0"/>
-              <a:t>6/10/2023</a:t>
+              <a:t>6/12/2023</a:t>
             </a:fld>
             <a:endParaRPr lang="en-US"/>
           </a:p>
@@ -1146,7 +1146,7 @@
           <a:p>
             <a:fld id="{A6DB111E-2BBC-4A19-AC5A-7193F79F09DA}" type="datetimeFigureOut">
               <a:rPr lang="en-US" smtClean="0"/>
-              <a:t>6/10/2023</a:t>
+              <a:t>6/12/2023</a:t>
             </a:fld>
             <a:endParaRPr lang="en-US"/>
           </a:p>
@@ -1411,7 +1411,7 @@
           <a:p>
             <a:fld id="{A6DB111E-2BBC-4A19-AC5A-7193F79F09DA}" type="datetimeFigureOut">
               <a:rPr lang="en-US" smtClean="0"/>
-              <a:t>6/10/2023</a:t>
+              <a:t>6/12/2023</a:t>
             </a:fld>
             <a:endParaRPr lang="en-US"/>
           </a:p>
@@ -1823,7 +1823,7 @@
           <a:p>
             <a:fld id="{A6DB111E-2BBC-4A19-AC5A-7193F79F09DA}" type="datetimeFigureOut">
               <a:rPr lang="en-US" smtClean="0"/>
-              <a:t>6/10/2023</a:t>
+              <a:t>6/12/2023</a:t>
             </a:fld>
             <a:endParaRPr lang="en-US"/>
           </a:p>
@@ -1964,7 +1964,7 @@
           <a:p>
             <a:fld id="{A6DB111E-2BBC-4A19-AC5A-7193F79F09DA}" type="datetimeFigureOut">
               <a:rPr lang="en-US" smtClean="0"/>
-              <a:t>6/10/2023</a:t>
+              <a:t>6/12/2023</a:t>
             </a:fld>
             <a:endParaRPr lang="en-US"/>
           </a:p>
@@ -2077,7 +2077,7 @@
           <a:p>
             <a:fld id="{A6DB111E-2BBC-4A19-AC5A-7193F79F09DA}" type="datetimeFigureOut">
               <a:rPr lang="en-US" smtClean="0"/>
-              <a:t>6/10/2023</a:t>
+              <a:t>6/12/2023</a:t>
             </a:fld>
             <a:endParaRPr lang="en-US"/>
           </a:p>
@@ -2388,7 +2388,7 @@
           <a:p>
             <a:fld id="{A6DB111E-2BBC-4A19-AC5A-7193F79F09DA}" type="datetimeFigureOut">
               <a:rPr lang="en-US" smtClean="0"/>
-              <a:t>6/10/2023</a:t>
+              <a:t>6/12/2023</a:t>
             </a:fld>
             <a:endParaRPr lang="en-US"/>
           </a:p>
@@ -2676,7 +2676,7 @@
           <a:p>
             <a:fld id="{A6DB111E-2BBC-4A19-AC5A-7193F79F09DA}" type="datetimeFigureOut">
               <a:rPr lang="en-US" smtClean="0"/>
-              <a:t>6/10/2023</a:t>
+              <a:t>6/12/2023</a:t>
             </a:fld>
             <a:endParaRPr lang="en-US"/>
           </a:p>
@@ -2917,7 +2917,7 @@
           <a:p>
             <a:fld id="{A6DB111E-2BBC-4A19-AC5A-7193F79F09DA}" type="datetimeFigureOut">
               <a:rPr lang="en-US" smtClean="0"/>
-              <a:t>6/10/2023</a:t>
+              <a:t>6/12/2023</a:t>
             </a:fld>
             <a:endParaRPr lang="en-US"/>
           </a:p>
@@ -16753,7 +16753,7 @@
                   <a:schemeClr val="tx1"/>
                 </a:solidFill>
               </a:rPr>
-              <a:t>יח - 18</a:t>
+              <a:t>חי - 18</a:t>
             </a:r>
           </a:p>
           <a:p>

</xml_diff>